<commit_message>
Work on GSCC19 deck
</commit_message>
<xml_diff>
--- a/GraniteStateCodeCamp2019/gscc19-pelazem.pptx
+++ b/GraniteStateCodeCamp2019/gscc19-pelazem.pptx
@@ -5,13 +5,17 @@
     <p:sldMasterId id="2147483732" r:id="rId1"/>
   </p:sldMasterIdLst>
   <p:notesMasterIdLst>
-    <p:notesMasterId r:id="rId6"/>
+    <p:notesMasterId r:id="rId10"/>
   </p:notesMasterIdLst>
   <p:sldIdLst>
     <p:sldId id="258" r:id="rId2"/>
     <p:sldId id="1595" r:id="rId3"/>
     <p:sldId id="1596" r:id="rId4"/>
     <p:sldId id="1597" r:id="rId5"/>
+    <p:sldId id="1598" r:id="rId6"/>
+    <p:sldId id="1599" r:id="rId7"/>
+    <p:sldId id="1600" r:id="rId8"/>
+    <p:sldId id="1601" r:id="rId9"/>
   </p:sldIdLst>
   <p:sldSz cx="12192000" cy="6858000"/>
   <p:notesSz cx="6858000" cy="9144000"/>
@@ -110,6 +114,11 @@
       </a:defRPr>
     </a:lvl9pPr>
   </p:defaultTextStyle>
+  <p:extLst>
+    <p:ext uri="{EFAFB233-063F-42B5-8137-9DF3F51BA10A}">
+      <p15:sldGuideLst xmlns:p15="http://schemas.microsoft.com/office/powerpoint/2012/main"/>
+    </p:ext>
+  </p:extLst>
 </p:presentation>
 </file>
 
@@ -195,7 +204,7 @@
           <a:p>
             <a:fld id="{946B34E3-E8F5-413F-8FB7-B5B835024008}" type="datetimeFigureOut">
               <a:rPr lang="en-US" smtClean="0"/>
-              <a:t>10/20/2019</a:t>
+              <a:t>10/24/2019</a:t>
             </a:fld>
             <a:endParaRPr lang="en-US"/>
           </a:p>
@@ -2077,7 +2086,7 @@
           <a:p>
             <a:fld id="{5E2A9F4F-03AD-4497-A65D-076601BD41D2}" type="datetime1">
               <a:rPr lang="en-US" smtClean="0"/>
-              <a:t>10/20/2019</a:t>
+              <a:t>10/24/2019</a:t>
             </a:fld>
             <a:endParaRPr lang="en-US"/>
           </a:p>
@@ -4289,7 +4298,7 @@
             </a:br>
             <a:r>
               <a:rPr lang="en-US" sz="7200" dirty="0"/>
-              <a:t>Still No PhD Needed</a:t>
+              <a:t>(Still No PhD Needed)</a:t>
             </a:r>
           </a:p>
         </p:txBody>
@@ -4654,7 +4663,7 @@
           <a:p>
             <a:r>
               <a:rPr lang="en-US" dirty="0"/>
-              <a:t>This session follows my 2018 session “Add AI to your App Today”</a:t>
+              <a:t>Today follows my 2018 session “Add AI to your App Today”</a:t>
             </a:r>
           </a:p>
           <a:p>
@@ -4663,7 +4672,16 @@
           <a:p>
             <a:r>
               <a:rPr lang="en-US" dirty="0"/>
-              <a:t>That session covers the basics; today’s session goes deeper</a:t>
+              <a:t>Last year covered the basics; today’s session goes deeper</a:t>
+            </a:r>
+          </a:p>
+          <a:p>
+            <a:endParaRPr lang="en-US" dirty="0"/>
+          </a:p>
+          <a:p>
+            <a:r>
+              <a:rPr lang="en-US" dirty="0"/>
+              <a:t>Audience: developers/architects with AI scenarios, not AI expertise</a:t>
             </a:r>
           </a:p>
         </p:txBody>
@@ -4690,6 +4708,448 @@
       </p:transition>
     </mc:Fallback>
   </mc:AlternateContent>
+  <p:timing>
+    <p:tnLst>
+      <p:par>
+        <p:cTn id="1" dur="indefinite" restart="never" nodeType="tmRoot">
+          <p:childTnLst>
+            <p:seq concurrent="1" nextAc="seek">
+              <p:cTn id="2" dur="indefinite" nodeType="mainSeq">
+                <p:childTnLst>
+                  <p:par>
+                    <p:cTn id="3" fill="hold">
+                      <p:stCondLst>
+                        <p:cond delay="indefinite"/>
+                      </p:stCondLst>
+                      <p:childTnLst>
+                        <p:par>
+                          <p:cTn id="4" fill="hold">
+                            <p:stCondLst>
+                              <p:cond delay="0"/>
+                            </p:stCondLst>
+                            <p:childTnLst>
+                              <p:par>
+                                <p:cTn id="5" presetID="2" presetClass="entr" presetSubtype="2" fill="hold" nodeType="clickEffect">
+                                  <p:stCondLst>
+                                    <p:cond delay="0"/>
+                                  </p:stCondLst>
+                                  <p:childTnLst>
+                                    <p:set>
+                                      <p:cBhvr>
+                                        <p:cTn id="6" dur="1" fill="hold">
+                                          <p:stCondLst>
+                                            <p:cond delay="0"/>
+                                          </p:stCondLst>
+                                        </p:cTn>
+                                        <p:tgtEl>
+                                          <p:spTgt spid="3">
+                                            <p:txEl>
+                                              <p:pRg st="0" end="0"/>
+                                            </p:txEl>
+                                          </p:spTgt>
+                                        </p:tgtEl>
+                                        <p:attrNameLst>
+                                          <p:attrName>style.visibility</p:attrName>
+                                        </p:attrNameLst>
+                                      </p:cBhvr>
+                                      <p:to>
+                                        <p:strVal val="visible"/>
+                                      </p:to>
+                                    </p:set>
+                                    <p:anim calcmode="lin" valueType="num">
+                                      <p:cBhvr additive="base">
+                                        <p:cTn id="7" dur="300" fill="hold"/>
+                                        <p:tgtEl>
+                                          <p:spTgt spid="3">
+                                            <p:txEl>
+                                              <p:pRg st="0" end="0"/>
+                                            </p:txEl>
+                                          </p:spTgt>
+                                        </p:tgtEl>
+                                        <p:attrNameLst>
+                                          <p:attrName>ppt_x</p:attrName>
+                                        </p:attrNameLst>
+                                      </p:cBhvr>
+                                      <p:tavLst>
+                                        <p:tav tm="0">
+                                          <p:val>
+                                            <p:strVal val="1+#ppt_w/2"/>
+                                          </p:val>
+                                        </p:tav>
+                                        <p:tav tm="100000">
+                                          <p:val>
+                                            <p:strVal val="#ppt_x"/>
+                                          </p:val>
+                                        </p:tav>
+                                      </p:tavLst>
+                                    </p:anim>
+                                    <p:anim calcmode="lin" valueType="num">
+                                      <p:cBhvr additive="base">
+                                        <p:cTn id="8" dur="300" fill="hold"/>
+                                        <p:tgtEl>
+                                          <p:spTgt spid="3">
+                                            <p:txEl>
+                                              <p:pRg st="0" end="0"/>
+                                            </p:txEl>
+                                          </p:spTgt>
+                                        </p:tgtEl>
+                                        <p:attrNameLst>
+                                          <p:attrName>ppt_y</p:attrName>
+                                        </p:attrNameLst>
+                                      </p:cBhvr>
+                                      <p:tavLst>
+                                        <p:tav tm="0">
+                                          <p:val>
+                                            <p:strVal val="#ppt_y"/>
+                                          </p:val>
+                                        </p:tav>
+                                        <p:tav tm="100000">
+                                          <p:val>
+                                            <p:strVal val="#ppt_y"/>
+                                          </p:val>
+                                        </p:tav>
+                                      </p:tavLst>
+                                    </p:anim>
+                                  </p:childTnLst>
+                                </p:cTn>
+                              </p:par>
+                            </p:childTnLst>
+                          </p:cTn>
+                        </p:par>
+                      </p:childTnLst>
+                    </p:cTn>
+                  </p:par>
+                  <p:par>
+                    <p:cTn id="9" fill="hold">
+                      <p:stCondLst>
+                        <p:cond delay="indefinite"/>
+                      </p:stCondLst>
+                      <p:childTnLst>
+                        <p:par>
+                          <p:cTn id="10" fill="hold">
+                            <p:stCondLst>
+                              <p:cond delay="0"/>
+                            </p:stCondLst>
+                            <p:childTnLst>
+                              <p:par>
+                                <p:cTn id="11" presetID="2" presetClass="entr" presetSubtype="2" fill="hold" nodeType="clickEffect">
+                                  <p:stCondLst>
+                                    <p:cond delay="0"/>
+                                  </p:stCondLst>
+                                  <p:childTnLst>
+                                    <p:set>
+                                      <p:cBhvr>
+                                        <p:cTn id="12" dur="1" fill="hold">
+                                          <p:stCondLst>
+                                            <p:cond delay="0"/>
+                                          </p:stCondLst>
+                                        </p:cTn>
+                                        <p:tgtEl>
+                                          <p:spTgt spid="3">
+                                            <p:txEl>
+                                              <p:pRg st="2" end="2"/>
+                                            </p:txEl>
+                                          </p:spTgt>
+                                        </p:tgtEl>
+                                        <p:attrNameLst>
+                                          <p:attrName>style.visibility</p:attrName>
+                                        </p:attrNameLst>
+                                      </p:cBhvr>
+                                      <p:to>
+                                        <p:strVal val="visible"/>
+                                      </p:to>
+                                    </p:set>
+                                    <p:anim calcmode="lin" valueType="num">
+                                      <p:cBhvr additive="base">
+                                        <p:cTn id="13" dur="300" fill="hold"/>
+                                        <p:tgtEl>
+                                          <p:spTgt spid="3">
+                                            <p:txEl>
+                                              <p:pRg st="2" end="2"/>
+                                            </p:txEl>
+                                          </p:spTgt>
+                                        </p:tgtEl>
+                                        <p:attrNameLst>
+                                          <p:attrName>ppt_x</p:attrName>
+                                        </p:attrNameLst>
+                                      </p:cBhvr>
+                                      <p:tavLst>
+                                        <p:tav tm="0">
+                                          <p:val>
+                                            <p:strVal val="1+#ppt_w/2"/>
+                                          </p:val>
+                                        </p:tav>
+                                        <p:tav tm="100000">
+                                          <p:val>
+                                            <p:strVal val="#ppt_x"/>
+                                          </p:val>
+                                        </p:tav>
+                                      </p:tavLst>
+                                    </p:anim>
+                                    <p:anim calcmode="lin" valueType="num">
+                                      <p:cBhvr additive="base">
+                                        <p:cTn id="14" dur="300" fill="hold"/>
+                                        <p:tgtEl>
+                                          <p:spTgt spid="3">
+                                            <p:txEl>
+                                              <p:pRg st="2" end="2"/>
+                                            </p:txEl>
+                                          </p:spTgt>
+                                        </p:tgtEl>
+                                        <p:attrNameLst>
+                                          <p:attrName>ppt_y</p:attrName>
+                                        </p:attrNameLst>
+                                      </p:cBhvr>
+                                      <p:tavLst>
+                                        <p:tav tm="0">
+                                          <p:val>
+                                            <p:strVal val="#ppt_y"/>
+                                          </p:val>
+                                        </p:tav>
+                                        <p:tav tm="100000">
+                                          <p:val>
+                                            <p:strVal val="#ppt_y"/>
+                                          </p:val>
+                                        </p:tav>
+                                      </p:tavLst>
+                                    </p:anim>
+                                  </p:childTnLst>
+                                </p:cTn>
+                              </p:par>
+                            </p:childTnLst>
+                          </p:cTn>
+                        </p:par>
+                      </p:childTnLst>
+                    </p:cTn>
+                  </p:par>
+                  <p:par>
+                    <p:cTn id="15" fill="hold">
+                      <p:stCondLst>
+                        <p:cond delay="indefinite"/>
+                      </p:stCondLst>
+                      <p:childTnLst>
+                        <p:par>
+                          <p:cTn id="16" fill="hold">
+                            <p:stCondLst>
+                              <p:cond delay="0"/>
+                            </p:stCondLst>
+                            <p:childTnLst>
+                              <p:par>
+                                <p:cTn id="17" presetID="2" presetClass="entr" presetSubtype="2" fill="hold" nodeType="clickEffect">
+                                  <p:stCondLst>
+                                    <p:cond delay="0"/>
+                                  </p:stCondLst>
+                                  <p:childTnLst>
+                                    <p:set>
+                                      <p:cBhvr>
+                                        <p:cTn id="18" dur="1" fill="hold">
+                                          <p:stCondLst>
+                                            <p:cond delay="0"/>
+                                          </p:stCondLst>
+                                        </p:cTn>
+                                        <p:tgtEl>
+                                          <p:spTgt spid="3">
+                                            <p:txEl>
+                                              <p:pRg st="4" end="4"/>
+                                            </p:txEl>
+                                          </p:spTgt>
+                                        </p:tgtEl>
+                                        <p:attrNameLst>
+                                          <p:attrName>style.visibility</p:attrName>
+                                        </p:attrNameLst>
+                                      </p:cBhvr>
+                                      <p:to>
+                                        <p:strVal val="visible"/>
+                                      </p:to>
+                                    </p:set>
+                                    <p:anim calcmode="lin" valueType="num">
+                                      <p:cBhvr additive="base">
+                                        <p:cTn id="19" dur="300" fill="hold"/>
+                                        <p:tgtEl>
+                                          <p:spTgt spid="3">
+                                            <p:txEl>
+                                              <p:pRg st="4" end="4"/>
+                                            </p:txEl>
+                                          </p:spTgt>
+                                        </p:tgtEl>
+                                        <p:attrNameLst>
+                                          <p:attrName>ppt_x</p:attrName>
+                                        </p:attrNameLst>
+                                      </p:cBhvr>
+                                      <p:tavLst>
+                                        <p:tav tm="0">
+                                          <p:val>
+                                            <p:strVal val="1+#ppt_w/2"/>
+                                          </p:val>
+                                        </p:tav>
+                                        <p:tav tm="100000">
+                                          <p:val>
+                                            <p:strVal val="#ppt_x"/>
+                                          </p:val>
+                                        </p:tav>
+                                      </p:tavLst>
+                                    </p:anim>
+                                    <p:anim calcmode="lin" valueType="num">
+                                      <p:cBhvr additive="base">
+                                        <p:cTn id="20" dur="300" fill="hold"/>
+                                        <p:tgtEl>
+                                          <p:spTgt spid="3">
+                                            <p:txEl>
+                                              <p:pRg st="4" end="4"/>
+                                            </p:txEl>
+                                          </p:spTgt>
+                                        </p:tgtEl>
+                                        <p:attrNameLst>
+                                          <p:attrName>ppt_y</p:attrName>
+                                        </p:attrNameLst>
+                                      </p:cBhvr>
+                                      <p:tavLst>
+                                        <p:tav tm="0">
+                                          <p:val>
+                                            <p:strVal val="#ppt_y"/>
+                                          </p:val>
+                                        </p:tav>
+                                        <p:tav tm="100000">
+                                          <p:val>
+                                            <p:strVal val="#ppt_y"/>
+                                          </p:val>
+                                        </p:tav>
+                                      </p:tavLst>
+                                    </p:anim>
+                                  </p:childTnLst>
+                                </p:cTn>
+                              </p:par>
+                            </p:childTnLst>
+                          </p:cTn>
+                        </p:par>
+                      </p:childTnLst>
+                    </p:cTn>
+                  </p:par>
+                  <p:par>
+                    <p:cTn id="21" fill="hold">
+                      <p:stCondLst>
+                        <p:cond delay="indefinite"/>
+                      </p:stCondLst>
+                      <p:childTnLst>
+                        <p:par>
+                          <p:cTn id="22" fill="hold">
+                            <p:stCondLst>
+                              <p:cond delay="0"/>
+                            </p:stCondLst>
+                            <p:childTnLst>
+                              <p:par>
+                                <p:cTn id="23" presetID="2" presetClass="entr" presetSubtype="2" fill="hold" nodeType="clickEffect">
+                                  <p:stCondLst>
+                                    <p:cond delay="0"/>
+                                  </p:stCondLst>
+                                  <p:childTnLst>
+                                    <p:set>
+                                      <p:cBhvr>
+                                        <p:cTn id="24" dur="1" fill="hold">
+                                          <p:stCondLst>
+                                            <p:cond delay="0"/>
+                                          </p:stCondLst>
+                                        </p:cTn>
+                                        <p:tgtEl>
+                                          <p:spTgt spid="3">
+                                            <p:txEl>
+                                              <p:pRg st="6" end="6"/>
+                                            </p:txEl>
+                                          </p:spTgt>
+                                        </p:tgtEl>
+                                        <p:attrNameLst>
+                                          <p:attrName>style.visibility</p:attrName>
+                                        </p:attrNameLst>
+                                      </p:cBhvr>
+                                      <p:to>
+                                        <p:strVal val="visible"/>
+                                      </p:to>
+                                    </p:set>
+                                    <p:anim calcmode="lin" valueType="num">
+                                      <p:cBhvr additive="base">
+                                        <p:cTn id="25" dur="300" fill="hold"/>
+                                        <p:tgtEl>
+                                          <p:spTgt spid="3">
+                                            <p:txEl>
+                                              <p:pRg st="6" end="6"/>
+                                            </p:txEl>
+                                          </p:spTgt>
+                                        </p:tgtEl>
+                                        <p:attrNameLst>
+                                          <p:attrName>ppt_x</p:attrName>
+                                        </p:attrNameLst>
+                                      </p:cBhvr>
+                                      <p:tavLst>
+                                        <p:tav tm="0">
+                                          <p:val>
+                                            <p:strVal val="1+#ppt_w/2"/>
+                                          </p:val>
+                                        </p:tav>
+                                        <p:tav tm="100000">
+                                          <p:val>
+                                            <p:strVal val="#ppt_x"/>
+                                          </p:val>
+                                        </p:tav>
+                                      </p:tavLst>
+                                    </p:anim>
+                                    <p:anim calcmode="lin" valueType="num">
+                                      <p:cBhvr additive="base">
+                                        <p:cTn id="26" dur="300" fill="hold"/>
+                                        <p:tgtEl>
+                                          <p:spTgt spid="3">
+                                            <p:txEl>
+                                              <p:pRg st="6" end="6"/>
+                                            </p:txEl>
+                                          </p:spTgt>
+                                        </p:tgtEl>
+                                        <p:attrNameLst>
+                                          <p:attrName>ppt_y</p:attrName>
+                                        </p:attrNameLst>
+                                      </p:cBhvr>
+                                      <p:tavLst>
+                                        <p:tav tm="0">
+                                          <p:val>
+                                            <p:strVal val="#ppt_y"/>
+                                          </p:val>
+                                        </p:tav>
+                                        <p:tav tm="100000">
+                                          <p:val>
+                                            <p:strVal val="#ppt_y"/>
+                                          </p:val>
+                                        </p:tav>
+                                      </p:tavLst>
+                                    </p:anim>
+                                  </p:childTnLst>
+                                </p:cTn>
+                              </p:par>
+                            </p:childTnLst>
+                          </p:cTn>
+                        </p:par>
+                      </p:childTnLst>
+                    </p:cTn>
+                  </p:par>
+                </p:childTnLst>
+              </p:cTn>
+              <p:prevCondLst>
+                <p:cond evt="onPrev" delay="0">
+                  <p:tgtEl>
+                    <p:sldTgt/>
+                  </p:tgtEl>
+                </p:cond>
+              </p:prevCondLst>
+              <p:nextCondLst>
+                <p:cond evt="onNext" delay="0">
+                  <p:tgtEl>
+                    <p:sldTgt/>
+                  </p:tgtEl>
+                </p:cond>
+              </p:nextCondLst>
+            </p:seq>
+          </p:childTnLst>
+        </p:cTn>
+      </p:par>
+    </p:tnLst>
+  </p:timing>
 </p:sld>
 </file>
 
@@ -4733,7 +5193,7 @@
           <a:p>
             <a:r>
               <a:rPr lang="en-US" dirty="0"/>
-              <a:t>Recap</a:t>
+              <a:t>Summary / Recap</a:t>
             </a:r>
           </a:p>
         </p:txBody>
@@ -4761,7 +5221,7 @@
           <a:p>
             <a:r>
               <a:rPr lang="en-US" dirty="0"/>
-              <a:t>AI build/deploy/maintain is difficult and costly</a:t>
+              <a:t>AI “from scratch” build/deploy/maintain is difficult and costly</a:t>
             </a:r>
           </a:p>
           <a:p>
@@ -4769,8 +5229,22 @@
           </a:p>
           <a:p>
             <a:r>
+              <a:rPr lang="en-US" dirty="0">
+                <a:sym typeface="Wingdings" panose="05000000000000000000" pitchFamily="2" charset="2"/>
+              </a:rPr>
+              <a:t> </a:t>
+            </a:r>
+            <a:r>
               <a:rPr lang="en-US" dirty="0"/>
-              <a:t>AI PaaS/SaaS services let you focus on functionality</a:t>
+              <a:t>AI </a:t>
+            </a:r>
+            <a:r>
+              <a:rPr lang="en-US" b="1" dirty="0"/>
+              <a:t>PaaS/SaaS services</a:t>
+            </a:r>
+            <a:r>
+              <a:rPr lang="en-US" dirty="0"/>
+              <a:t>: you focus on scenarios and integration, service provider on build/deploy/maintain</a:t>
             </a:r>
           </a:p>
           <a:p>
@@ -4778,35 +5252,30 @@
           </a:p>
           <a:p>
             <a:r>
+              <a:rPr lang="en-US" sz="3600" b="1" u="sng" dirty="0"/>
+              <a:t>Microsoft Azure Cognitive Services</a:t>
+            </a:r>
+          </a:p>
+          <a:p>
+            <a:pPr lvl="1"/>
+            <a:r>
               <a:rPr lang="en-US" dirty="0"/>
-              <a:t>Microsoft Azure Cognitive Services</a:t>
+              <a:t>AI APIs; each provides a specific AI capability</a:t>
             </a:r>
           </a:p>
           <a:p>
             <a:pPr lvl="1"/>
             <a:r>
               <a:rPr lang="en-US" dirty="0"/>
-              <a:t>AI APIs; each addresses a specific AI capability</a:t>
+              <a:t>Examples: speech to text, face recognition, custom vision, many more</a:t>
             </a:r>
           </a:p>
           <a:p>
             <a:pPr lvl="1"/>
             <a:r>
               <a:rPr lang="en-US" dirty="0"/>
-              <a:t>Examples: speech to text, face recognition, many more</a:t>
-            </a:r>
-          </a:p>
-          <a:p>
-            <a:pPr lvl="1"/>
-            <a:r>
-              <a:rPr lang="en-US" dirty="0"/>
-              <a:t>Integrate via REST </a:t>
-            </a:r>
-            <a:r>
-              <a:rPr lang="en-US"/>
-              <a:t>API or SDKs</a:t>
-            </a:r>
-            <a:endParaRPr lang="en-US" dirty="0"/>
+              <a:t>Integrate via REST API or SDKs</a:t>
+            </a:r>
           </a:p>
           <a:p>
             <a:pPr lvl="1"/>
@@ -4821,6 +5290,573 @@
     <p:extLst>
       <p:ext uri="{BB962C8B-B14F-4D97-AF65-F5344CB8AC3E}">
         <p14:creationId xmlns:p14="http://schemas.microsoft.com/office/powerpoint/2010/main" val="4029634992"/>
+      </p:ext>
+    </p:extLst>
+  </p:cSld>
+  <p:clrMapOvr>
+    <a:masterClrMapping/>
+  </p:clrMapOvr>
+  <mc:AlternateContent xmlns:mc="http://schemas.openxmlformats.org/markup-compatibility/2006" xmlns:p14="http://schemas.microsoft.com/office/powerpoint/2010/main">
+    <mc:Choice Requires="p14">
+      <p:transition spd="med" p14:dur="700">
+        <p:fade/>
+      </p:transition>
+    </mc:Choice>
+    <mc:Fallback xmlns="">
+      <p:transition spd="med">
+        <p:fade/>
+      </p:transition>
+    </mc:Fallback>
+  </mc:AlternateContent>
+</p:sld>
+</file>
+
+<file path=ppt/slides/slide5.xml><?xml version="1.0" encoding="utf-8"?>
+<p:sld xmlns:a="http://schemas.openxmlformats.org/drawingml/2006/main" xmlns:r="http://schemas.openxmlformats.org/officeDocument/2006/relationships" xmlns:p="http://schemas.openxmlformats.org/presentationml/2006/main">
+  <p:cSld>
+    <p:spTree>
+      <p:nvGrpSpPr>
+        <p:cNvPr id="1" name=""/>
+        <p:cNvGrpSpPr/>
+        <p:nvPr/>
+      </p:nvGrpSpPr>
+      <p:grpSpPr>
+        <a:xfrm>
+          <a:off x="0" y="0"/>
+          <a:ext cx="0" cy="0"/>
+          <a:chOff x="0" y="0"/>
+          <a:chExt cx="0" cy="0"/>
+        </a:xfrm>
+      </p:grpSpPr>
+      <p:sp>
+        <p:nvSpPr>
+          <p:cNvPr id="2" name="Title 1">
+            <a:extLst>
+              <a:ext uri="{FF2B5EF4-FFF2-40B4-BE49-F238E27FC236}">
+                <a16:creationId xmlns:a16="http://schemas.microsoft.com/office/drawing/2014/main" id="{87B12B7E-FA9A-4E21-BC2E-68D1CB3B1D98}"/>
+              </a:ext>
+            </a:extLst>
+          </p:cNvPr>
+          <p:cNvSpPr>
+            <a:spLocks noGrp="1"/>
+          </p:cNvSpPr>
+          <p:nvPr>
+            <p:ph type="title"/>
+          </p:nvPr>
+        </p:nvSpPr>
+        <p:spPr/>
+        <p:txBody>
+          <a:bodyPr/>
+          <a:lstStyle/>
+          <a:p>
+            <a:r>
+              <a:rPr lang="en-US" dirty="0"/>
+              <a:t>Scenarios</a:t>
+            </a:r>
+          </a:p>
+        </p:txBody>
+      </p:sp>
+      <p:sp>
+        <p:nvSpPr>
+          <p:cNvPr id="3" name="Content Placeholder 2">
+            <a:extLst>
+              <a:ext uri="{FF2B5EF4-FFF2-40B4-BE49-F238E27FC236}">
+                <a16:creationId xmlns:a16="http://schemas.microsoft.com/office/drawing/2014/main" id="{27824832-593D-46EA-9240-2CC017EA9110}"/>
+              </a:ext>
+            </a:extLst>
+          </p:cNvPr>
+          <p:cNvSpPr>
+            <a:spLocks noGrp="1"/>
+          </p:cNvSpPr>
+          <p:nvPr>
+            <p:ph idx="1"/>
+          </p:nvPr>
+        </p:nvSpPr>
+        <p:spPr/>
+        <p:txBody>
+          <a:bodyPr anchor="t"/>
+          <a:lstStyle/>
+          <a:p>
+            <a:pPr marL="0" indent="0">
+              <a:buNone/>
+            </a:pPr>
+            <a:endParaRPr lang="en-US" dirty="0"/>
+          </a:p>
+          <a:p>
+            <a:pPr marL="0" indent="0">
+              <a:buNone/>
+            </a:pPr>
+            <a:r>
+              <a:rPr lang="en-US" dirty="0"/>
+              <a:t>Today we will examine real world scenarios:</a:t>
+            </a:r>
+          </a:p>
+          <a:p>
+            <a:pPr marL="514350" indent="-514350">
+              <a:buFont typeface="+mj-lt"/>
+              <a:buAutoNum type="arabicPeriod"/>
+            </a:pPr>
+            <a:r>
+              <a:rPr lang="en-US" dirty="0"/>
+              <a:t>Personalized Recommendations</a:t>
+            </a:r>
+          </a:p>
+          <a:p>
+            <a:pPr marL="514350" indent="-514350">
+              <a:buFont typeface="+mj-lt"/>
+              <a:buAutoNum type="arabicPeriod"/>
+            </a:pPr>
+            <a:r>
+              <a:rPr lang="en-US" dirty="0"/>
+              <a:t>Form Recognition</a:t>
+            </a:r>
+          </a:p>
+          <a:p>
+            <a:pPr marL="514350" indent="-514350">
+              <a:buFont typeface="+mj-lt"/>
+              <a:buAutoNum type="arabicPeriod"/>
+            </a:pPr>
+            <a:r>
+              <a:rPr lang="en-US" dirty="0"/>
+              <a:t>Custom Vision</a:t>
+            </a:r>
+          </a:p>
+          <a:p>
+            <a:pPr marL="514350" indent="-514350">
+              <a:buFont typeface="+mj-lt"/>
+              <a:buAutoNum type="arabicPeriod"/>
+            </a:pPr>
+            <a:endParaRPr lang="en-US" dirty="0"/>
+          </a:p>
+          <a:p>
+            <a:r>
+              <a:rPr lang="en-US" dirty="0"/>
+              <a:t>Use Case</a:t>
+            </a:r>
+          </a:p>
+          <a:p>
+            <a:r>
+              <a:rPr lang="en-US" dirty="0"/>
+              <a:t>AI Service</a:t>
+            </a:r>
+          </a:p>
+          <a:p>
+            <a:r>
+              <a:rPr lang="en-US" dirty="0"/>
+              <a:t>Implementation / Demo</a:t>
+            </a:r>
+          </a:p>
+        </p:txBody>
+      </p:sp>
+    </p:spTree>
+    <p:extLst>
+      <p:ext uri="{BB962C8B-B14F-4D97-AF65-F5344CB8AC3E}">
+        <p14:creationId xmlns:p14="http://schemas.microsoft.com/office/powerpoint/2010/main" val="144555849"/>
+      </p:ext>
+    </p:extLst>
+  </p:cSld>
+  <p:clrMapOvr>
+    <a:masterClrMapping/>
+  </p:clrMapOvr>
+  <mc:AlternateContent xmlns:mc="http://schemas.openxmlformats.org/markup-compatibility/2006" xmlns:p14="http://schemas.microsoft.com/office/powerpoint/2010/main">
+    <mc:Choice Requires="p14">
+      <p:transition spd="med" p14:dur="700">
+        <p:fade/>
+      </p:transition>
+    </mc:Choice>
+    <mc:Fallback xmlns="">
+      <p:transition spd="med">
+        <p:fade/>
+      </p:transition>
+    </mc:Fallback>
+  </mc:AlternateContent>
+</p:sld>
+</file>
+
+<file path=ppt/slides/slide6.xml><?xml version="1.0" encoding="utf-8"?>
+<p:sld xmlns:a="http://schemas.openxmlformats.org/drawingml/2006/main" xmlns:r="http://schemas.openxmlformats.org/officeDocument/2006/relationships" xmlns:p="http://schemas.openxmlformats.org/presentationml/2006/main">
+  <p:cSld>
+    <p:spTree>
+      <p:nvGrpSpPr>
+        <p:cNvPr id="1" name=""/>
+        <p:cNvGrpSpPr/>
+        <p:nvPr/>
+      </p:nvGrpSpPr>
+      <p:grpSpPr>
+        <a:xfrm>
+          <a:off x="0" y="0"/>
+          <a:ext cx="0" cy="0"/>
+          <a:chOff x="0" y="0"/>
+          <a:chExt cx="0" cy="0"/>
+        </a:xfrm>
+      </p:grpSpPr>
+      <p:sp>
+        <p:nvSpPr>
+          <p:cNvPr id="4" name="Title 3">
+            <a:extLst>
+              <a:ext uri="{FF2B5EF4-FFF2-40B4-BE49-F238E27FC236}">
+                <a16:creationId xmlns:a16="http://schemas.microsoft.com/office/drawing/2014/main" id="{1A18C07A-8F1C-4CC1-A1AA-74BDEFFBE25C}"/>
+              </a:ext>
+            </a:extLst>
+          </p:cNvPr>
+          <p:cNvSpPr>
+            <a:spLocks noGrp="1"/>
+          </p:cNvSpPr>
+          <p:nvPr>
+            <p:ph type="title"/>
+          </p:nvPr>
+        </p:nvSpPr>
+        <p:spPr>
+          <a:xfrm>
+            <a:off x="269238" y="1036221"/>
+            <a:ext cx="11653523" cy="1015663"/>
+          </a:xfrm>
+        </p:spPr>
+        <p:txBody>
+          <a:bodyPr/>
+          <a:lstStyle/>
+          <a:p>
+            <a:r>
+              <a:rPr lang="en-US" sz="6000" dirty="0"/>
+              <a:t>Personalized Recommendations</a:t>
+            </a:r>
+          </a:p>
+        </p:txBody>
+      </p:sp>
+      <p:pic>
+        <p:nvPicPr>
+          <p:cNvPr id="5" name="Picture 4">
+            <a:extLst>
+              <a:ext uri="{FF2B5EF4-FFF2-40B4-BE49-F238E27FC236}">
+                <a16:creationId xmlns:a16="http://schemas.microsoft.com/office/drawing/2014/main" id="{D70F2DC7-AA64-4AB8-AFA9-7FA2520AE860}"/>
+              </a:ext>
+            </a:extLst>
+          </p:cNvPr>
+          <p:cNvPicPr>
+            <a:picLocks noChangeAspect="1"/>
+          </p:cNvPicPr>
+          <p:nvPr/>
+        </p:nvPicPr>
+        <p:blipFill>
+          <a:blip r:embed="rId2"/>
+          <a:stretch>
+            <a:fillRect/>
+          </a:stretch>
+        </p:blipFill>
+        <p:spPr>
+          <a:xfrm>
+            <a:off x="1480211" y="2960772"/>
+            <a:ext cx="9910049" cy="3148263"/>
+          </a:xfrm>
+          <a:prstGeom prst="rect">
+            <a:avLst/>
+          </a:prstGeom>
+        </p:spPr>
+      </p:pic>
+    </p:spTree>
+    <p:extLst>
+      <p:ext uri="{BB962C8B-B14F-4D97-AF65-F5344CB8AC3E}">
+        <p14:creationId xmlns:p14="http://schemas.microsoft.com/office/powerpoint/2010/main" val="3029011905"/>
+      </p:ext>
+    </p:extLst>
+  </p:cSld>
+  <p:clrMapOvr>
+    <a:masterClrMapping/>
+  </p:clrMapOvr>
+  <p:transition>
+    <p:fade/>
+  </p:transition>
+</p:sld>
+</file>
+
+<file path=ppt/slides/slide7.xml><?xml version="1.0" encoding="utf-8"?>
+<p:sld xmlns:a="http://schemas.openxmlformats.org/drawingml/2006/main" xmlns:r="http://schemas.openxmlformats.org/officeDocument/2006/relationships" xmlns:p="http://schemas.openxmlformats.org/presentationml/2006/main">
+  <p:cSld>
+    <p:spTree>
+      <p:nvGrpSpPr>
+        <p:cNvPr id="1" name=""/>
+        <p:cNvGrpSpPr/>
+        <p:nvPr/>
+      </p:nvGrpSpPr>
+      <p:grpSpPr>
+        <a:xfrm>
+          <a:off x="0" y="0"/>
+          <a:ext cx="0" cy="0"/>
+          <a:chOff x="0" y="0"/>
+          <a:chExt cx="0" cy="0"/>
+        </a:xfrm>
+      </p:grpSpPr>
+      <p:sp>
+        <p:nvSpPr>
+          <p:cNvPr id="3" name="Title 2">
+            <a:extLst>
+              <a:ext uri="{FF2B5EF4-FFF2-40B4-BE49-F238E27FC236}">
+                <a16:creationId xmlns:a16="http://schemas.microsoft.com/office/drawing/2014/main" id="{27229925-8D34-40DE-8250-615522102C7B}"/>
+              </a:ext>
+            </a:extLst>
+          </p:cNvPr>
+          <p:cNvSpPr>
+            <a:spLocks noGrp="1"/>
+          </p:cNvSpPr>
+          <p:nvPr>
+            <p:ph type="title"/>
+          </p:nvPr>
+        </p:nvSpPr>
+        <p:spPr/>
+        <p:txBody>
+          <a:bodyPr/>
+          <a:lstStyle/>
+          <a:p>
+            <a:r>
+              <a:rPr lang="en-US" dirty="0"/>
+              <a:t>Use Case</a:t>
+            </a:r>
+          </a:p>
+        </p:txBody>
+      </p:sp>
+      <p:sp>
+        <p:nvSpPr>
+          <p:cNvPr id="4" name="Content Placeholder 3">
+            <a:extLst>
+              <a:ext uri="{FF2B5EF4-FFF2-40B4-BE49-F238E27FC236}">
+                <a16:creationId xmlns:a16="http://schemas.microsoft.com/office/drawing/2014/main" id="{D4ABCF94-5F3E-428C-AB4C-3F2AC7616027}"/>
+              </a:ext>
+            </a:extLst>
+          </p:cNvPr>
+          <p:cNvSpPr>
+            <a:spLocks noGrp="1"/>
+          </p:cNvSpPr>
+          <p:nvPr>
+            <p:ph idx="1"/>
+          </p:nvPr>
+        </p:nvSpPr>
+        <p:spPr/>
+        <p:txBody>
+          <a:bodyPr anchor="t"/>
+          <a:lstStyle/>
+          <a:p>
+            <a:pPr marL="0" indent="0">
+              <a:buNone/>
+            </a:pPr>
+            <a:r>
+              <a:rPr lang="en-US" dirty="0"/>
+              <a:t>“We’d like to give people</a:t>
+            </a:r>
+          </a:p>
+          <a:p>
+            <a:pPr marL="0" indent="0">
+              <a:buNone/>
+            </a:pPr>
+            <a:r>
+              <a:rPr lang="en-US" i="1" dirty="0"/>
+              <a:t>	</a:t>
+            </a:r>
+            <a:r>
+              <a:rPr lang="en-US" b="1" i="1" dirty="0"/>
+              <a:t>personalized</a:t>
+            </a:r>
+            <a:r>
+              <a:rPr lang="en-US" dirty="0"/>
+              <a:t> recommendations</a:t>
+            </a:r>
+          </a:p>
+          <a:p>
+            <a:pPr marL="0" indent="0">
+              <a:buNone/>
+            </a:pPr>
+            <a:r>
+              <a:rPr lang="en-US" dirty="0"/>
+              <a:t>	for what to do next”</a:t>
+            </a:r>
+          </a:p>
+          <a:p>
+            <a:pPr>
+              <a:buFont typeface="Wingdings" panose="05000000000000000000" pitchFamily="2" charset="2"/>
+              <a:buChar char="à"/>
+            </a:pPr>
+            <a:r>
+              <a:rPr lang="en-US" dirty="0">
+                <a:sym typeface="Wingdings" panose="05000000000000000000" pitchFamily="2" charset="2"/>
+              </a:rPr>
+              <a:t> </a:t>
+            </a:r>
+            <a:r>
+              <a:rPr lang="en-US" b="1" dirty="0">
+                <a:sym typeface="Wingdings" panose="05000000000000000000" pitchFamily="2" charset="2"/>
+              </a:rPr>
+              <a:t>Buy</a:t>
+            </a:r>
+            <a:r>
+              <a:rPr lang="en-US" dirty="0">
+                <a:sym typeface="Wingdings" panose="05000000000000000000" pitchFamily="2" charset="2"/>
+              </a:rPr>
+              <a:t> next, </a:t>
+            </a:r>
+            <a:r>
+              <a:rPr lang="en-US" b="1" dirty="0">
+                <a:sym typeface="Wingdings" panose="05000000000000000000" pitchFamily="2" charset="2"/>
+              </a:rPr>
+              <a:t>read</a:t>
+            </a:r>
+            <a:r>
+              <a:rPr lang="en-US" dirty="0">
+                <a:sym typeface="Wingdings" panose="05000000000000000000" pitchFamily="2" charset="2"/>
+              </a:rPr>
+              <a:t> next, where to </a:t>
+            </a:r>
+            <a:r>
+              <a:rPr lang="en-US" b="1" dirty="0">
+                <a:sym typeface="Wingdings" panose="05000000000000000000" pitchFamily="2" charset="2"/>
+              </a:rPr>
+              <a:t>go</a:t>
+            </a:r>
+            <a:r>
+              <a:rPr lang="en-US" dirty="0">
+                <a:sym typeface="Wingdings" panose="05000000000000000000" pitchFamily="2" charset="2"/>
+              </a:rPr>
+              <a:t> next, etc.</a:t>
+            </a:r>
+          </a:p>
+          <a:p>
+            <a:pPr marL="0" indent="0">
+              <a:buNone/>
+            </a:pPr>
+            <a:endParaRPr lang="en-US" dirty="0">
+              <a:sym typeface="Wingdings" panose="05000000000000000000" pitchFamily="2" charset="2"/>
+            </a:endParaRPr>
+          </a:p>
+          <a:p>
+            <a:pPr marL="0" indent="0">
+              <a:buNone/>
+            </a:pPr>
+            <a:r>
+              <a:rPr lang="en-US" dirty="0">
+                <a:sym typeface="Wingdings" panose="05000000000000000000" pitchFamily="2" charset="2"/>
+              </a:rPr>
+              <a:t>Why is this compelling?</a:t>
+            </a:r>
+          </a:p>
+          <a:p>
+            <a:pPr marL="0" indent="0">
+              <a:buNone/>
+            </a:pPr>
+            <a:r>
+              <a:rPr lang="en-US" dirty="0">
+                <a:sym typeface="Wingdings" panose="05000000000000000000" pitchFamily="2" charset="2"/>
+              </a:rPr>
+              <a:t>Personal = engaging; generic = boring.</a:t>
+            </a:r>
+          </a:p>
+          <a:p>
+            <a:pPr marL="0" indent="0">
+              <a:buNone/>
+            </a:pPr>
+            <a:endParaRPr lang="en-US" dirty="0"/>
+          </a:p>
+          <a:p>
+            <a:pPr marL="0" indent="0">
+              <a:buNone/>
+            </a:pPr>
+            <a:endParaRPr lang="en-US" dirty="0"/>
+          </a:p>
+        </p:txBody>
+      </p:sp>
+    </p:spTree>
+    <p:extLst>
+      <p:ext uri="{BB962C8B-B14F-4D97-AF65-F5344CB8AC3E}">
+        <p14:creationId xmlns:p14="http://schemas.microsoft.com/office/powerpoint/2010/main" val="4041171351"/>
+      </p:ext>
+    </p:extLst>
+  </p:cSld>
+  <p:clrMapOvr>
+    <a:masterClrMapping/>
+  </p:clrMapOvr>
+  <mc:AlternateContent xmlns:mc="http://schemas.openxmlformats.org/markup-compatibility/2006" xmlns:p14="http://schemas.microsoft.com/office/powerpoint/2010/main">
+    <mc:Choice Requires="p14">
+      <p:transition spd="med" p14:dur="700">
+        <p:fade/>
+      </p:transition>
+    </mc:Choice>
+    <mc:Fallback xmlns="">
+      <p:transition spd="med">
+        <p:fade/>
+      </p:transition>
+    </mc:Fallback>
+  </mc:AlternateContent>
+</p:sld>
+</file>
+
+<file path=ppt/slides/slide8.xml><?xml version="1.0" encoding="utf-8"?>
+<p:sld xmlns:a="http://schemas.openxmlformats.org/drawingml/2006/main" xmlns:r="http://schemas.openxmlformats.org/officeDocument/2006/relationships" xmlns:p="http://schemas.openxmlformats.org/presentationml/2006/main">
+  <p:cSld>
+    <p:spTree>
+      <p:nvGrpSpPr>
+        <p:cNvPr id="1" name=""/>
+        <p:cNvGrpSpPr/>
+        <p:nvPr/>
+      </p:nvGrpSpPr>
+      <p:grpSpPr>
+        <a:xfrm>
+          <a:off x="0" y="0"/>
+          <a:ext cx="0" cy="0"/>
+          <a:chOff x="0" y="0"/>
+          <a:chExt cx="0" cy="0"/>
+        </a:xfrm>
+      </p:grpSpPr>
+      <p:sp>
+        <p:nvSpPr>
+          <p:cNvPr id="2" name="Title 1">
+            <a:extLst>
+              <a:ext uri="{FF2B5EF4-FFF2-40B4-BE49-F238E27FC236}">
+                <a16:creationId xmlns:a16="http://schemas.microsoft.com/office/drawing/2014/main" id="{62476AB5-2BA9-41B2-A387-D6E88AA64C27}"/>
+              </a:ext>
+            </a:extLst>
+          </p:cNvPr>
+          <p:cNvSpPr>
+            <a:spLocks noGrp="1"/>
+          </p:cNvSpPr>
+          <p:nvPr>
+            <p:ph type="title"/>
+          </p:nvPr>
+        </p:nvSpPr>
+        <p:spPr/>
+        <p:txBody>
+          <a:bodyPr/>
+          <a:lstStyle/>
+          <a:p>
+            <a:endParaRPr lang="en-US" dirty="0"/>
+          </a:p>
+        </p:txBody>
+      </p:sp>
+      <p:sp>
+        <p:nvSpPr>
+          <p:cNvPr id="3" name="Content Placeholder 2">
+            <a:extLst>
+              <a:ext uri="{FF2B5EF4-FFF2-40B4-BE49-F238E27FC236}">
+                <a16:creationId xmlns:a16="http://schemas.microsoft.com/office/drawing/2014/main" id="{9A127FE1-A123-4F68-AD93-336CB79490E9}"/>
+              </a:ext>
+            </a:extLst>
+          </p:cNvPr>
+          <p:cNvSpPr>
+            <a:spLocks noGrp="1"/>
+          </p:cNvSpPr>
+          <p:nvPr>
+            <p:ph idx="1"/>
+          </p:nvPr>
+        </p:nvSpPr>
+        <p:spPr/>
+        <p:txBody>
+          <a:bodyPr/>
+          <a:lstStyle/>
+          <a:p>
+            <a:endParaRPr lang="en-US"/>
+          </a:p>
+        </p:txBody>
+      </p:sp>
+    </p:spTree>
+    <p:extLst>
+      <p:ext uri="{BB962C8B-B14F-4D97-AF65-F5344CB8AC3E}">
+        <p14:creationId xmlns:p14="http://schemas.microsoft.com/office/powerpoint/2010/main" val="705126725"/>
       </p:ext>
     </p:extLst>
   </p:cSld>

</xml_diff>